<commit_message>
Wrong powerpoint, fixed now
</commit_message>
<xml_diff>
--- a/BIOF309 Presentation.pptx
+++ b/BIOF309 Presentation.pptx
@@ -11,6 +11,7 @@
     <p:sldId id="260" r:id="rId5"/>
     <p:sldId id="262" r:id="rId6"/>
     <p:sldId id="259" r:id="rId7"/>
+    <p:sldId id="264" r:id="rId8"/>
   </p:sldIdLst>
   <p:sldSz cx="12192000" cy="6858000"/>
   <p:notesSz cx="6858000" cy="9144000"/>
@@ -109,6 +110,11 @@
       </a:defRPr>
     </a:lvl9pPr>
   </p:defaultTextStyle>
+  <p:extLst>
+    <p:ext uri="{EFAFB233-063F-42B5-8137-9DF3F51BA10A}">
+      <p15:sldGuideLst xmlns:p15="http://schemas.microsoft.com/office/powerpoint/2012/main"/>
+    </p:ext>
+  </p:extLst>
 </p:presentation>
 </file>
 
@@ -116,8 +122,8 @@
 <pc:chgInfo xmlns:a="http://schemas.openxmlformats.org/drawingml/2006/main" xmlns:r="http://schemas.openxmlformats.org/officeDocument/2006/relationships" xmlns:ac="http://schemas.microsoft.com/office/drawing/2013/main/command" xmlns:pc="http://schemas.microsoft.com/office/powerpoint/2013/main/command">
   <pc:docChgLst>
     <pc:chgData name="Ryan Mayers" userId="d240618df3f2c8af" providerId="LiveId" clId="{43CC9BFE-2E91-4F36-8CCE-CD80F2382348}"/>
-    <pc:docChg chg="custSel modSld">
-      <pc:chgData name="Ryan Mayers" userId="d240618df3f2c8af" providerId="LiveId" clId="{43CC9BFE-2E91-4F36-8CCE-CD80F2382348}" dt="2017-12-11T18:57:45.920" v="61" actId="20577"/>
+    <pc:docChg chg="custSel addSld delSld modSld">
+      <pc:chgData name="Ryan Mayers" userId="d240618df3f2c8af" providerId="LiveId" clId="{43CC9BFE-2E91-4F36-8CCE-CD80F2382348}" dt="2017-12-11T20:10:50.012" v="526" actId="1036"/>
       <pc:docMkLst>
         <pc:docMk/>
       </pc:docMkLst>
@@ -135,6 +141,107 @@
             <ac:spMk id="3" creationId="{5EB2C4DF-421A-4FE5-86D9-9886298F83C1}"/>
           </ac:spMkLst>
         </pc:spChg>
+      </pc:sldChg>
+      <pc:sldChg chg="modSp">
+        <pc:chgData name="Ryan Mayers" userId="d240618df3f2c8af" providerId="LiveId" clId="{43CC9BFE-2E91-4F36-8CCE-CD80F2382348}" dt="2017-12-11T20:05:03.047" v="216" actId="20577"/>
+        <pc:sldMkLst>
+          <pc:docMk/>
+          <pc:sldMk cId="1500384935" sldId="259"/>
+        </pc:sldMkLst>
+        <pc:spChg chg="mod">
+          <ac:chgData name="Ryan Mayers" userId="d240618df3f2c8af" providerId="LiveId" clId="{43CC9BFE-2E91-4F36-8CCE-CD80F2382348}" dt="2017-12-11T20:05:03.047" v="216" actId="20577"/>
+          <ac:spMkLst>
+            <pc:docMk/>
+            <pc:sldMk cId="1500384935" sldId="259"/>
+            <ac:spMk id="3" creationId="{E5F100EF-CE7E-4CD2-B003-DF455BAF282F}"/>
+          </ac:spMkLst>
+        </pc:spChg>
+      </pc:sldChg>
+      <pc:sldChg chg="addSp delSp modSp add del">
+        <pc:chgData name="Ryan Mayers" userId="d240618df3f2c8af" providerId="LiveId" clId="{43CC9BFE-2E91-4F36-8CCE-CD80F2382348}" dt="2017-12-11T20:06:06.143" v="399" actId="2696"/>
+        <pc:sldMkLst>
+          <pc:docMk/>
+          <pc:sldMk cId="3726862587" sldId="263"/>
+        </pc:sldMkLst>
+        <pc:spChg chg="mod">
+          <ac:chgData name="Ryan Mayers" userId="d240618df3f2c8af" providerId="LiveId" clId="{43CC9BFE-2E91-4F36-8CCE-CD80F2382348}" dt="2017-12-11T20:05:14.323" v="235" actId="20577"/>
+          <ac:spMkLst>
+            <pc:docMk/>
+            <pc:sldMk cId="3726862587" sldId="263"/>
+            <ac:spMk id="2" creationId="{8C983A52-9750-4CFE-BC0D-656B6128248D}"/>
+          </ac:spMkLst>
+        </pc:spChg>
+        <pc:spChg chg="del">
+          <ac:chgData name="Ryan Mayers" userId="d240618df3f2c8af" providerId="LiveId" clId="{43CC9BFE-2E91-4F36-8CCE-CD80F2382348}" dt="2017-12-11T20:04:43.722" v="211" actId="931"/>
+          <ac:spMkLst>
+            <pc:docMk/>
+            <pc:sldMk cId="3726862587" sldId="263"/>
+            <ac:spMk id="3" creationId="{34C1D2D7-BF06-4D30-8BC3-06E26C0DE653}"/>
+          </ac:spMkLst>
+        </pc:spChg>
+        <pc:spChg chg="add mod">
+          <ac:chgData name="Ryan Mayers" userId="d240618df3f2c8af" providerId="LiveId" clId="{43CC9BFE-2E91-4F36-8CCE-CD80F2382348}" dt="2017-12-11T20:06:02.540" v="397" actId="2696"/>
+          <ac:spMkLst>
+            <pc:docMk/>
+            <pc:sldMk cId="3726862587" sldId="263"/>
+            <ac:spMk id="8" creationId="{29F1E50A-8673-48DD-861E-A90014E78AB0}"/>
+          </ac:spMkLst>
+        </pc:spChg>
+        <pc:picChg chg="add del mod">
+          <ac:chgData name="Ryan Mayers" userId="d240618df3f2c8af" providerId="LiveId" clId="{43CC9BFE-2E91-4F36-8CCE-CD80F2382348}" dt="2017-12-11T20:06:02.540" v="397" actId="2696"/>
+          <ac:picMkLst>
+            <pc:docMk/>
+            <pc:sldMk cId="3726862587" sldId="263"/>
+            <ac:picMk id="5" creationId="{55AD1758-39AD-492C-963F-871D5115F821}"/>
+          </ac:picMkLst>
+        </pc:picChg>
+        <pc:picChg chg="add del mod">
+          <ac:chgData name="Ryan Mayers" userId="d240618df3f2c8af" providerId="LiveId" clId="{43CC9BFE-2E91-4F36-8CCE-CD80F2382348}" dt="2017-12-11T20:06:02.540" v="397" actId="2696"/>
+          <ac:picMkLst>
+            <pc:docMk/>
+            <pc:sldMk cId="3726862587" sldId="263"/>
+            <ac:picMk id="7" creationId="{45FBA81A-EA72-4CF2-98F9-6209EAB6E540}"/>
+          </ac:picMkLst>
+        </pc:picChg>
+      </pc:sldChg>
+      <pc:sldChg chg="addSp modSp add">
+        <pc:chgData name="Ryan Mayers" userId="d240618df3f2c8af" providerId="LiveId" clId="{43CC9BFE-2E91-4F36-8CCE-CD80F2382348}" dt="2017-12-11T20:10:50.012" v="526" actId="1036"/>
+        <pc:sldMkLst>
+          <pc:docMk/>
+          <pc:sldMk cId="3006858768" sldId="264"/>
+        </pc:sldMkLst>
+        <pc:spChg chg="mod">
+          <ac:chgData name="Ryan Mayers" userId="d240618df3f2c8af" providerId="LiveId" clId="{43CC9BFE-2E91-4F36-8CCE-CD80F2382348}" dt="2017-12-11T20:05:23.042" v="255" actId="20577"/>
+          <ac:spMkLst>
+            <pc:docMk/>
+            <pc:sldMk cId="3006858768" sldId="264"/>
+            <ac:spMk id="2" creationId="{D01A6181-4AB1-4C4F-85F9-6F9EED047EF8}"/>
+          </ac:spMkLst>
+        </pc:spChg>
+        <pc:spChg chg="mod">
+          <ac:chgData name="Ryan Mayers" userId="d240618df3f2c8af" providerId="LiveId" clId="{43CC9BFE-2E91-4F36-8CCE-CD80F2382348}" dt="2017-12-11T20:10:43.580" v="503" actId="20577"/>
+          <ac:spMkLst>
+            <pc:docMk/>
+            <pc:sldMk cId="3006858768" sldId="264"/>
+            <ac:spMk id="3" creationId="{2C5016C0-C990-42FB-A8EB-361AFF817426}"/>
+          </ac:spMkLst>
+        </pc:spChg>
+        <pc:picChg chg="add mod">
+          <ac:chgData name="Ryan Mayers" userId="d240618df3f2c8af" providerId="LiveId" clId="{43CC9BFE-2E91-4F36-8CCE-CD80F2382348}" dt="2017-12-11T20:10:50.012" v="526" actId="1036"/>
+          <ac:picMkLst>
+            <pc:docMk/>
+            <pc:sldMk cId="3006858768" sldId="264"/>
+            <ac:picMk id="4" creationId="{99C96E9B-59D2-40B8-9402-36AA9A972818}"/>
+          </ac:picMkLst>
+        </pc:picChg>
+        <pc:picChg chg="add mod">
+          <ac:chgData name="Ryan Mayers" userId="d240618df3f2c8af" providerId="LiveId" clId="{43CC9BFE-2E91-4F36-8CCE-CD80F2382348}" dt="2017-12-11T20:10:50.012" v="526" actId="1036"/>
+          <ac:picMkLst>
+            <pc:docMk/>
+            <pc:sldMk cId="3006858768" sldId="264"/>
+            <ac:picMk id="5" creationId="{443FF6FE-2CE1-43D2-931E-9A7861190491}"/>
+          </ac:picMkLst>
+        </pc:picChg>
       </pc:sldChg>
     </pc:docChg>
   </pc:docChgLst>
@@ -4106,6 +4213,191 @@
 </p:sld>
 </file>
 
+<file path=ppt/slides/slide7.xml><?xml version="1.0" encoding="utf-8"?>
+<p:sld xmlns:a="http://schemas.openxmlformats.org/drawingml/2006/main" xmlns:r="http://schemas.openxmlformats.org/officeDocument/2006/relationships" xmlns:p="http://schemas.openxmlformats.org/presentationml/2006/main">
+  <p:cSld>
+    <p:spTree>
+      <p:nvGrpSpPr>
+        <p:cNvPr id="1" name=""/>
+        <p:cNvGrpSpPr/>
+        <p:nvPr/>
+      </p:nvGrpSpPr>
+      <p:grpSpPr>
+        <a:xfrm>
+          <a:off x="0" y="0"/>
+          <a:ext cx="0" cy="0"/>
+          <a:chOff x="0" y="0"/>
+          <a:chExt cx="0" cy="0"/>
+        </a:xfrm>
+      </p:grpSpPr>
+      <p:sp>
+        <p:nvSpPr>
+          <p:cNvPr id="2" name="Title 1">
+            <a:extLst>
+              <a:ext uri="{FF2B5EF4-FFF2-40B4-BE49-F238E27FC236}">
+                <a16:creationId xmlns:a16="http://schemas.microsoft.com/office/drawing/2014/main" id="{D01A6181-4AB1-4C4F-85F9-6F9EED047EF8}"/>
+              </a:ext>
+            </a:extLst>
+          </p:cNvPr>
+          <p:cNvSpPr>
+            <a:spLocks noGrp="1"/>
+          </p:cNvSpPr>
+          <p:nvPr>
+            <p:ph type="title"/>
+          </p:nvPr>
+        </p:nvSpPr>
+        <p:spPr/>
+        <p:txBody>
+          <a:bodyPr/>
+          <a:lstStyle/>
+          <a:p>
+            <a:r>
+              <a:rPr lang="en-US" dirty="0"/>
+              <a:t>Factors to Consider</a:t>
+            </a:r>
+          </a:p>
+        </p:txBody>
+      </p:sp>
+      <p:sp>
+        <p:nvSpPr>
+          <p:cNvPr id="3" name="Content Placeholder 2">
+            <a:extLst>
+              <a:ext uri="{FF2B5EF4-FFF2-40B4-BE49-F238E27FC236}">
+                <a16:creationId xmlns:a16="http://schemas.microsoft.com/office/drawing/2014/main" id="{2C5016C0-C990-42FB-A8EB-361AFF817426}"/>
+              </a:ext>
+            </a:extLst>
+          </p:cNvPr>
+          <p:cNvSpPr>
+            <a:spLocks noGrp="1"/>
+          </p:cNvSpPr>
+          <p:nvPr>
+            <p:ph idx="1"/>
+          </p:nvPr>
+        </p:nvSpPr>
+        <p:spPr/>
+        <p:txBody>
+          <a:bodyPr/>
+          <a:lstStyle/>
+          <a:p>
+            <a:r>
+              <a:rPr lang="en-US" dirty="0"/>
+              <a:t>Improve familiarity with </a:t>
+            </a:r>
+            <a:r>
+              <a:rPr lang="en-US" dirty="0" err="1"/>
+              <a:t>NumPy</a:t>
+            </a:r>
+            <a:r>
+              <a:rPr lang="en-US" dirty="0"/>
+              <a:t>/Formatting</a:t>
+            </a:r>
+          </a:p>
+          <a:p>
+            <a:pPr lvl="1"/>
+            <a:r>
+              <a:rPr lang="en-US" dirty="0"/>
+              <a:t>Regressions?</a:t>
+            </a:r>
+          </a:p>
+          <a:p>
+            <a:r>
+              <a:rPr lang="en-US" dirty="0"/>
+              <a:t>Consider increasing number of surveys used (= more samples)</a:t>
+            </a:r>
+          </a:p>
+          <a:p>
+            <a:r>
+              <a:rPr lang="en-US" dirty="0"/>
+              <a:t>Add user input controls to allow better presentation of results?</a:t>
+            </a:r>
+          </a:p>
+        </p:txBody>
+      </p:sp>
+      <p:pic>
+        <p:nvPicPr>
+          <p:cNvPr id="4" name="Content Placeholder 4">
+            <a:extLst>
+              <a:ext uri="{FF2B5EF4-FFF2-40B4-BE49-F238E27FC236}">
+                <a16:creationId xmlns:a16="http://schemas.microsoft.com/office/drawing/2014/main" id="{99C96E9B-59D2-40B8-9402-36AA9A972818}"/>
+              </a:ext>
+            </a:extLst>
+          </p:cNvPr>
+          <p:cNvPicPr>
+            <a:picLocks noChangeAspect="1"/>
+          </p:cNvPicPr>
+          <p:nvPr/>
+        </p:nvPicPr>
+        <p:blipFill>
+          <a:blip r:embed="rId2">
+            <a:extLst>
+              <a:ext uri="{28A0092B-C50C-407E-A947-70E740481C1C}">
+                <a14:useLocalDpi xmlns:a14="http://schemas.microsoft.com/office/drawing/2010/main" val="0"/>
+              </a:ext>
+            </a:extLst>
+          </a:blip>
+          <a:stretch>
+            <a:fillRect/>
+          </a:stretch>
+        </p:blipFill>
+        <p:spPr>
+          <a:xfrm>
+            <a:off x="906458" y="3798668"/>
+            <a:ext cx="4633362" cy="2697714"/>
+          </a:xfrm>
+          <a:prstGeom prst="rect">
+            <a:avLst/>
+          </a:prstGeom>
+        </p:spPr>
+      </p:pic>
+      <p:pic>
+        <p:nvPicPr>
+          <p:cNvPr id="5" name="Picture 4">
+            <a:extLst>
+              <a:ext uri="{FF2B5EF4-FFF2-40B4-BE49-F238E27FC236}">
+                <a16:creationId xmlns:a16="http://schemas.microsoft.com/office/drawing/2014/main" id="{443FF6FE-2CE1-43D2-931E-9A7861190491}"/>
+              </a:ext>
+            </a:extLst>
+          </p:cNvPr>
+          <p:cNvPicPr>
+            <a:picLocks noChangeAspect="1"/>
+          </p:cNvPicPr>
+          <p:nvPr/>
+        </p:nvPicPr>
+        <p:blipFill>
+          <a:blip r:embed="rId3">
+            <a:extLst>
+              <a:ext uri="{28A0092B-C50C-407E-A947-70E740481C1C}">
+                <a14:useLocalDpi xmlns:a14="http://schemas.microsoft.com/office/drawing/2010/main" val="0"/>
+              </a:ext>
+            </a:extLst>
+          </a:blip>
+          <a:stretch>
+            <a:fillRect/>
+          </a:stretch>
+        </p:blipFill>
+        <p:spPr>
+          <a:xfrm>
+            <a:off x="6126355" y="3798668"/>
+            <a:ext cx="5159187" cy="2663421"/>
+          </a:xfrm>
+          <a:prstGeom prst="rect">
+            <a:avLst/>
+          </a:prstGeom>
+        </p:spPr>
+      </p:pic>
+    </p:spTree>
+    <p:extLst>
+      <p:ext uri="{BB962C8B-B14F-4D97-AF65-F5344CB8AC3E}">
+        <p14:creationId xmlns:p14="http://schemas.microsoft.com/office/powerpoint/2010/main" val="3006858768"/>
+      </p:ext>
+    </p:extLst>
+  </p:cSld>
+  <p:clrMapOvr>
+    <a:masterClrMapping/>
+  </p:clrMapOvr>
+</p:sld>
+</file>
+
 <file path=ppt/theme/theme1.xml><?xml version="1.0" encoding="utf-8"?>
 <a:theme xmlns:a="http://schemas.openxmlformats.org/drawingml/2006/main" name="Office Theme">
   <a:themeElements>

</xml_diff>

<commit_message>
Beta version(?) Uploaded, updated presentation
</commit_message>
<xml_diff>
--- a/BIOF309 Presentation.pptx
+++ b/BIOF309 Presentation.pptx
@@ -8,10 +8,11 @@
     <p:sldId id="256" r:id="rId2"/>
     <p:sldId id="261" r:id="rId3"/>
     <p:sldId id="257" r:id="rId4"/>
-    <p:sldId id="260" r:id="rId5"/>
-    <p:sldId id="262" r:id="rId6"/>
+    <p:sldId id="265" r:id="rId5"/>
+    <p:sldId id="260" r:id="rId6"/>
     <p:sldId id="259" r:id="rId7"/>
     <p:sldId id="264" r:id="rId8"/>
+    <p:sldId id="266" r:id="rId9"/>
   </p:sldIdLst>
   <p:sldSz cx="12192000" cy="6858000"/>
   <p:notesSz cx="6858000" cy="9144000"/>
@@ -116,6 +117,10 @@
     </p:ext>
   </p:extLst>
 </p:presentation>
+</file>
+
+<file path=ppt/revisionInfo.xml><?xml version="1.0" encoding="utf-8"?>
+<p1510:revInfo xmlns:a="http://schemas.openxmlformats.org/drawingml/2006/main" xmlns:r="http://schemas.openxmlformats.org/officeDocument/2006/relationships" xmlns:p1510="http://schemas.microsoft.com/office/powerpoint/2015/10/main"/>
 </file>
 
 <file path=ppt/changesInfos/changesInfo1.xml><?xml version="1.0" encoding="utf-8"?>
@@ -395,7 +400,7 @@
           <a:p>
             <a:fld id="{1FF2BA2A-162E-49FA-9429-3C05D7B01FC1}" type="datetimeFigureOut">
               <a:rPr lang="en-US" smtClean="0"/>
-              <a:t>12/11/2017</a:t>
+              <a:t>12/18/2017</a:t>
             </a:fld>
             <a:endParaRPr lang="en-US"/>
           </a:p>
@@ -593,7 +598,7 @@
           <a:p>
             <a:fld id="{1FF2BA2A-162E-49FA-9429-3C05D7B01FC1}" type="datetimeFigureOut">
               <a:rPr lang="en-US" smtClean="0"/>
-              <a:t>12/11/2017</a:t>
+              <a:t>12/18/2017</a:t>
             </a:fld>
             <a:endParaRPr lang="en-US"/>
           </a:p>
@@ -801,7 +806,7 @@
           <a:p>
             <a:fld id="{1FF2BA2A-162E-49FA-9429-3C05D7B01FC1}" type="datetimeFigureOut">
               <a:rPr lang="en-US" smtClean="0"/>
-              <a:t>12/11/2017</a:t>
+              <a:t>12/18/2017</a:t>
             </a:fld>
             <a:endParaRPr lang="en-US"/>
           </a:p>
@@ -999,7 +1004,7 @@
           <a:p>
             <a:fld id="{1FF2BA2A-162E-49FA-9429-3C05D7B01FC1}" type="datetimeFigureOut">
               <a:rPr lang="en-US" smtClean="0"/>
-              <a:t>12/11/2017</a:t>
+              <a:t>12/18/2017</a:t>
             </a:fld>
             <a:endParaRPr lang="en-US"/>
           </a:p>
@@ -1274,7 +1279,7 @@
           <a:p>
             <a:fld id="{1FF2BA2A-162E-49FA-9429-3C05D7B01FC1}" type="datetimeFigureOut">
               <a:rPr lang="en-US" smtClean="0"/>
-              <a:t>12/11/2017</a:t>
+              <a:t>12/18/2017</a:t>
             </a:fld>
             <a:endParaRPr lang="en-US"/>
           </a:p>
@@ -1539,7 +1544,7 @@
           <a:p>
             <a:fld id="{1FF2BA2A-162E-49FA-9429-3C05D7B01FC1}" type="datetimeFigureOut">
               <a:rPr lang="en-US" smtClean="0"/>
-              <a:t>12/11/2017</a:t>
+              <a:t>12/18/2017</a:t>
             </a:fld>
             <a:endParaRPr lang="en-US"/>
           </a:p>
@@ -1951,7 +1956,7 @@
           <a:p>
             <a:fld id="{1FF2BA2A-162E-49FA-9429-3C05D7B01FC1}" type="datetimeFigureOut">
               <a:rPr lang="en-US" smtClean="0"/>
-              <a:t>12/11/2017</a:t>
+              <a:t>12/18/2017</a:t>
             </a:fld>
             <a:endParaRPr lang="en-US"/>
           </a:p>
@@ -2092,7 +2097,7 @@
           <a:p>
             <a:fld id="{1FF2BA2A-162E-49FA-9429-3C05D7B01FC1}" type="datetimeFigureOut">
               <a:rPr lang="en-US" smtClean="0"/>
-              <a:t>12/11/2017</a:t>
+              <a:t>12/18/2017</a:t>
             </a:fld>
             <a:endParaRPr lang="en-US"/>
           </a:p>
@@ -2205,7 +2210,7 @@
           <a:p>
             <a:fld id="{1FF2BA2A-162E-49FA-9429-3C05D7B01FC1}" type="datetimeFigureOut">
               <a:rPr lang="en-US" smtClean="0"/>
-              <a:t>12/11/2017</a:t>
+              <a:t>12/18/2017</a:t>
             </a:fld>
             <a:endParaRPr lang="en-US"/>
           </a:p>
@@ -2516,7 +2521,7 @@
           <a:p>
             <a:fld id="{1FF2BA2A-162E-49FA-9429-3C05D7B01FC1}" type="datetimeFigureOut">
               <a:rPr lang="en-US" smtClean="0"/>
-              <a:t>12/11/2017</a:t>
+              <a:t>12/18/2017</a:t>
             </a:fld>
             <a:endParaRPr lang="en-US"/>
           </a:p>
@@ -2804,7 +2809,7 @@
           <a:p>
             <a:fld id="{1FF2BA2A-162E-49FA-9429-3C05D7B01FC1}" type="datetimeFigureOut">
               <a:rPr lang="en-US" smtClean="0"/>
-              <a:t>12/11/2017</a:t>
+              <a:t>12/18/2017</a:t>
             </a:fld>
             <a:endParaRPr lang="en-US"/>
           </a:p>
@@ -3045,7 +3050,7 @@
           <a:p>
             <a:fld id="{1FF2BA2A-162E-49FA-9429-3C05D7B01FC1}" type="datetimeFigureOut">
               <a:rPr lang="en-US" smtClean="0"/>
-              <a:t>12/11/2017</a:t>
+              <a:t>12/18/2017</a:t>
             </a:fld>
             <a:endParaRPr lang="en-US"/>
           </a:p>
@@ -3601,7 +3606,7 @@
           <a:p>
             <a:r>
               <a:rPr lang="en-US" dirty="0"/>
-              <a:t>Using 2015 &amp; 2016 Pew Global Attitudes Survey</a:t>
+              <a:t>Using 2014-2016 Pew Global Attitudes Survey</a:t>
             </a:r>
           </a:p>
           <a:p>
@@ -3613,7 +3618,7 @@
           <a:p>
             <a:r>
               <a:rPr lang="en-US" dirty="0"/>
-              <a:t>Intersection with economic, climate concerns</a:t>
+              <a:t>Intersection with economic concerns</a:t>
             </a:r>
           </a:p>
         </p:txBody>
@@ -3794,7 +3799,7 @@
           <p:cNvPr id="2" name="Title 1">
             <a:extLst>
               <a:ext uri="{FF2B5EF4-FFF2-40B4-BE49-F238E27FC236}">
-                <a16:creationId xmlns:a16="http://schemas.microsoft.com/office/drawing/2014/main" id="{16E4FE96-7AD4-4AD5-B00E-0CDD1AC12883}"/>
+                <a16:creationId xmlns:a16="http://schemas.microsoft.com/office/drawing/2014/main" id="{FACEF4EE-114B-4F46-BCEB-4A836CF6465D}"/>
               </a:ext>
             </a:extLst>
           </p:cNvPr>
@@ -3812,7 +3817,7 @@
           <a:p>
             <a:r>
               <a:rPr lang="en-US" dirty="0"/>
-              <a:t>Analysis</a:t>
+              <a:t>Limitations (cont.)</a:t>
             </a:r>
           </a:p>
         </p:txBody>
@@ -3822,7 +3827,7 @@
           <p:cNvPr id="3" name="Content Placeholder 2">
             <a:extLst>
               <a:ext uri="{FF2B5EF4-FFF2-40B4-BE49-F238E27FC236}">
-                <a16:creationId xmlns:a16="http://schemas.microsoft.com/office/drawing/2014/main" id="{1C56D446-8E84-4F9A-B1A2-F4C03EBD9EF5}"/>
+                <a16:creationId xmlns:a16="http://schemas.microsoft.com/office/drawing/2014/main" id="{57C259DF-2D2C-4E94-9FCA-990F910BBF6B}"/>
               </a:ext>
             </a:extLst>
           </p:cNvPr>
@@ -3835,85 +3840,98 @@
         </p:nvSpPr>
         <p:spPr/>
         <p:txBody>
-          <a:bodyPr>
-            <a:normAutofit/>
-          </a:bodyPr>
+          <a:bodyPr/>
           <a:lstStyle/>
           <a:p>
             <a:r>
               <a:rPr lang="en-US" dirty="0"/>
-              <a:t>9 questions (7 from each year)</a:t>
-            </a:r>
-          </a:p>
-          <a:p>
-            <a:pPr lvl="1"/>
+              <a:t>Data ultimately too limited for analysis project</a:t>
+            </a:r>
+          </a:p>
+          <a:p>
             <a:r>
               <a:rPr lang="en-US" dirty="0"/>
-              <a:t>Health care as a major national problem</a:t>
-            </a:r>
-          </a:p>
-          <a:p>
-            <a:pPr lvl="1"/>
-            <a:r>
-              <a:rPr lang="en-US" dirty="0"/>
-              <a:t>Health care as most urgent priority</a:t>
-            </a:r>
-          </a:p>
-          <a:p>
-            <a:pPr lvl="1"/>
-            <a:r>
-              <a:rPr lang="en-US" dirty="0"/>
-              <a:t>Optimism health care will improve (2016)</a:t>
-            </a:r>
-          </a:p>
-          <a:p>
-            <a:pPr lvl="1"/>
-            <a:r>
-              <a:rPr lang="en-US" dirty="0"/>
-              <a:t>Personal issues affording health care in past year (2016) </a:t>
-            </a:r>
-          </a:p>
-          <a:p>
-            <a:pPr lvl="1"/>
-            <a:r>
-              <a:rPr lang="en-US" dirty="0"/>
-              <a:t>View of current economic situation</a:t>
-            </a:r>
-          </a:p>
-          <a:p>
-            <a:pPr lvl="1"/>
-            <a:r>
-              <a:rPr lang="en-US" dirty="0"/>
-              <a:t>Optimism about economy</a:t>
-            </a:r>
-          </a:p>
-          <a:p>
-            <a:pPr lvl="1"/>
-            <a:r>
-              <a:rPr lang="en-US" dirty="0"/>
-              <a:t>Concern over global economic instability</a:t>
-            </a:r>
-          </a:p>
-          <a:p>
-            <a:pPr lvl="1"/>
-            <a:r>
-              <a:rPr lang="en-US" dirty="0"/>
-              <a:t>Perception climate change is a current problem (2015)</a:t>
-            </a:r>
-          </a:p>
-          <a:p>
-            <a:pPr lvl="1"/>
-            <a:r>
-              <a:rPr lang="en-US" dirty="0"/>
-              <a:t>Expectation of being personally affected by climate change (2015)</a:t>
-            </a:r>
-          </a:p>
-        </p:txBody>
-      </p:sp>
+              <a:t>Switched to proof-of-concept for interactive user interface/analysis</a:t>
+            </a:r>
+          </a:p>
+        </p:txBody>
+      </p:sp>
+      <p:pic>
+        <p:nvPicPr>
+          <p:cNvPr id="4" name="Content Placeholder 4">
+            <a:extLst>
+              <a:ext uri="{FF2B5EF4-FFF2-40B4-BE49-F238E27FC236}">
+                <a16:creationId xmlns:a16="http://schemas.microsoft.com/office/drawing/2014/main" id="{56EFA952-6721-4A4B-BB6F-3C4D8E83492F}"/>
+              </a:ext>
+            </a:extLst>
+          </p:cNvPr>
+          <p:cNvPicPr>
+            <a:picLocks noChangeAspect="1"/>
+          </p:cNvPicPr>
+          <p:nvPr/>
+        </p:nvPicPr>
+        <p:blipFill>
+          <a:blip r:embed="rId2">
+            <a:extLst>
+              <a:ext uri="{28A0092B-C50C-407E-A947-70E740481C1C}">
+                <a14:useLocalDpi xmlns:a14="http://schemas.microsoft.com/office/drawing/2010/main" val="0"/>
+              </a:ext>
+            </a:extLst>
+          </a:blip>
+          <a:stretch>
+            <a:fillRect/>
+          </a:stretch>
+        </p:blipFill>
+        <p:spPr>
+          <a:xfrm>
+            <a:off x="-5599" y="3267635"/>
+            <a:ext cx="5545419" cy="3228747"/>
+          </a:xfrm>
+          <a:prstGeom prst="rect">
+            <a:avLst/>
+          </a:prstGeom>
+        </p:spPr>
+      </p:pic>
+      <p:pic>
+        <p:nvPicPr>
+          <p:cNvPr id="5" name="Picture 4">
+            <a:extLst>
+              <a:ext uri="{FF2B5EF4-FFF2-40B4-BE49-F238E27FC236}">
+                <a16:creationId xmlns:a16="http://schemas.microsoft.com/office/drawing/2014/main" id="{7BE28C5A-6B81-4AB2-807B-909D33696B5E}"/>
+              </a:ext>
+            </a:extLst>
+          </p:cNvPr>
+          <p:cNvPicPr>
+            <a:picLocks noChangeAspect="1"/>
+          </p:cNvPicPr>
+          <p:nvPr/>
+        </p:nvPicPr>
+        <p:blipFill>
+          <a:blip r:embed="rId3">
+            <a:extLst>
+              <a:ext uri="{28A0092B-C50C-407E-A947-70E740481C1C}">
+                <a14:useLocalDpi xmlns:a14="http://schemas.microsoft.com/office/drawing/2010/main" val="0"/>
+              </a:ext>
+            </a:extLst>
+          </a:blip>
+          <a:stretch>
+            <a:fillRect/>
+          </a:stretch>
+        </p:blipFill>
+        <p:spPr>
+          <a:xfrm>
+            <a:off x="6126355" y="3330388"/>
+            <a:ext cx="6066270" cy="3131701"/>
+          </a:xfrm>
+          <a:prstGeom prst="rect">
+            <a:avLst/>
+          </a:prstGeom>
+        </p:spPr>
+      </p:pic>
     </p:spTree>
     <p:extLst>
       <p:ext uri="{BB962C8B-B14F-4D97-AF65-F5344CB8AC3E}">
-        <p14:creationId xmlns:p14="http://schemas.microsoft.com/office/powerpoint/2010/main" val="3551915346"/>
+        <p14:creationId xmlns:p14="http://schemas.microsoft.com/office/powerpoint/2010/main" val="3220446207"/>
       </p:ext>
     </p:extLst>
   </p:cSld>
@@ -3945,7 +3963,7 @@
           <p:cNvPr id="2" name="Title 1">
             <a:extLst>
               <a:ext uri="{FF2B5EF4-FFF2-40B4-BE49-F238E27FC236}">
-                <a16:creationId xmlns:a16="http://schemas.microsoft.com/office/drawing/2014/main" id="{54E03364-737F-4D91-9E90-464519360AD3}"/>
+                <a16:creationId xmlns:a16="http://schemas.microsoft.com/office/drawing/2014/main" id="{16E4FE96-7AD4-4AD5-B00E-0CDD1AC12883}"/>
               </a:ext>
             </a:extLst>
           </p:cNvPr>
@@ -3963,7 +3981,7 @@
           <a:p>
             <a:r>
               <a:rPr lang="en-US" dirty="0"/>
-              <a:t>Analysis (cont.)</a:t>
+              <a:t>Analysis</a:t>
             </a:r>
           </a:p>
         </p:txBody>
@@ -3973,7 +3991,7 @@
           <p:cNvPr id="3" name="Content Placeholder 2">
             <a:extLst>
               <a:ext uri="{FF2B5EF4-FFF2-40B4-BE49-F238E27FC236}">
-                <a16:creationId xmlns:a16="http://schemas.microsoft.com/office/drawing/2014/main" id="{8D6686C5-1C0C-451D-BDEE-6816DF3558B6}"/>
+                <a16:creationId xmlns:a16="http://schemas.microsoft.com/office/drawing/2014/main" id="{1C56D446-8E84-4F9A-B1A2-F4C03EBD9EF5}"/>
               </a:ext>
             </a:extLst>
           </p:cNvPr>
@@ -3986,8 +4004,43 @@
         </p:nvSpPr>
         <p:spPr/>
         <p:txBody>
-          <a:bodyPr/>
-          <a:lstStyle/>
+          <a:bodyPr>
+            <a:normAutofit/>
+          </a:bodyPr>
+          <a:lstStyle/>
+          <a:p>
+            <a:r>
+              <a:rPr lang="en-US" dirty="0"/>
+              <a:t>3 questions</a:t>
+            </a:r>
+          </a:p>
+          <a:p>
+            <a:pPr lvl="1"/>
+            <a:r>
+              <a:rPr lang="en-US" dirty="0"/>
+              <a:t>Health care as a major national problem</a:t>
+            </a:r>
+          </a:p>
+          <a:p>
+            <a:pPr lvl="1"/>
+            <a:r>
+              <a:rPr lang="en-US" dirty="0"/>
+              <a:t>View of current economic situation</a:t>
+            </a:r>
+          </a:p>
+          <a:p>
+            <a:pPr lvl="1"/>
+            <a:r>
+              <a:rPr lang="en-US" dirty="0"/>
+              <a:t>Optimism about economy</a:t>
+            </a:r>
+          </a:p>
+          <a:p>
+            <a:r>
+              <a:rPr lang="en-US" dirty="0"/>
+              <a:t>Also measuring change between surveys</a:t>
+            </a:r>
+          </a:p>
           <a:p>
             <a:r>
               <a:rPr lang="en-US" dirty="0"/>
@@ -3995,40 +4048,6 @@
             </a:r>
           </a:p>
           <a:p>
-            <a:r>
-              <a:rPr lang="en-US" dirty="0"/>
-              <a:t>Also examining change between 2015-2016 perceptions</a:t>
-            </a:r>
-          </a:p>
-          <a:p>
-            <a:r>
-              <a:rPr lang="en-US" dirty="0"/>
-              <a:t>Searching for correlations between:</a:t>
-            </a:r>
-          </a:p>
-          <a:p>
-            <a:pPr lvl="1"/>
-            <a:r>
-              <a:rPr lang="en-US" dirty="0"/>
-              <a:t>Health care perceptions and economic or climate perceptions</a:t>
-            </a:r>
-          </a:p>
-          <a:p>
-            <a:pPr lvl="1"/>
-            <a:r>
-              <a:rPr lang="en-US" dirty="0"/>
-              <a:t>Current healthcare perceptions and personal impact or optimism</a:t>
-            </a:r>
-          </a:p>
-          <a:p>
-            <a:pPr lvl="1"/>
-            <a:r>
-              <a:rPr lang="en-US" dirty="0"/>
-              <a:t>Trends of above between 2015 and 2016</a:t>
-            </a:r>
-          </a:p>
-          <a:p>
-            <a:pPr lvl="1"/>
             <a:endParaRPr lang="en-US" dirty="0"/>
           </a:p>
         </p:txBody>
@@ -4036,7 +4055,7 @@
     </p:spTree>
     <p:extLst>
       <p:ext uri="{BB962C8B-B14F-4D97-AF65-F5344CB8AC3E}">
-        <p14:creationId xmlns:p14="http://schemas.microsoft.com/office/powerpoint/2010/main" val="1036226436"/>
+        <p14:creationId xmlns:p14="http://schemas.microsoft.com/office/powerpoint/2010/main" val="3551915346"/>
       </p:ext>
     </p:extLst>
   </p:cSld>
@@ -4109,12 +4128,14 @@
         </p:nvSpPr>
         <p:spPr/>
         <p:txBody>
-          <a:bodyPr/>
+          <a:bodyPr>
+            <a:normAutofit lnSpcReduction="10000"/>
+          </a:bodyPr>
           <a:lstStyle/>
           <a:p>
             <a:r>
               <a:rPr lang="en-US" dirty="0"/>
-              <a:t>Planned out in pseudo-code/outlines first</a:t>
+              <a:t>Planned out in outlines first</a:t>
             </a:r>
           </a:p>
           <a:p>
@@ -4129,7 +4150,7 @@
             </a:r>
             <a:r>
               <a:rPr lang="en-US" dirty="0"/>
-              <a:t>) and </a:t>
+              <a:t>), </a:t>
             </a:r>
             <a:r>
               <a:rPr lang="en-US" dirty="0" err="1"/>
@@ -4144,7 +4165,7 @@
             <a:pPr lvl="1"/>
             <a:r>
               <a:rPr lang="en-US" dirty="0"/>
-              <a:t>Examining if </a:t>
+              <a:t>Will use </a:t>
             </a:r>
             <a:r>
               <a:rPr lang="en-US" dirty="0" err="1"/>
@@ -4152,7 +4173,7 @@
             </a:r>
             <a:r>
               <a:rPr lang="en-US" dirty="0"/>
-              <a:t>/any statistical work makes sense</a:t>
+              <a:t> for R values</a:t>
             </a:r>
           </a:p>
           <a:p>
@@ -4191,12 +4212,28 @@
           <a:p>
             <a:r>
               <a:rPr lang="en-US" dirty="0"/>
-              <a:t>Final Product: Charts, R-Values, and commentary for each result</a:t>
+              <a:t>Use of conditionals and while loops with user interface</a:t>
             </a:r>
           </a:p>
           <a:p>
             <a:pPr lvl="1"/>
-            <a:endParaRPr lang="en-US" dirty="0"/>
+            <a:r>
+              <a:rPr lang="en-US" dirty="0"/>
+              <a:t>Manually generates all possible combinations from behind the scenes</a:t>
+            </a:r>
+          </a:p>
+          <a:p>
+            <a:pPr lvl="1"/>
+            <a:r>
+              <a:rPr lang="en-US" dirty="0"/>
+              <a:t>Prepares for and prevents any non-requested input/potential crash options</a:t>
+            </a:r>
+          </a:p>
+          <a:p>
+            <a:r>
+              <a:rPr lang="en-US" dirty="0"/>
+              <a:t>Final Product: Charts, R-Values, User control</a:t>
+            </a:r>
           </a:p>
         </p:txBody>
       </p:sp>
@@ -4253,7 +4290,7 @@
           <a:p>
             <a:r>
               <a:rPr lang="en-US" dirty="0"/>
-              <a:t>Factors to Consider</a:t>
+              <a:t>Final Product</a:t>
             </a:r>
           </a:p>
         </p:txBody>
@@ -4281,44 +4318,111 @@
           <a:p>
             <a:r>
               <a:rPr lang="en-US" dirty="0"/>
-              <a:t>Improve familiarity with </a:t>
-            </a:r>
-            <a:r>
-              <a:rPr lang="en-US" dirty="0" err="1"/>
-              <a:t>NumPy</a:t>
-            </a:r>
+              <a:t>Generate failproof user-requested charts &amp; R-values</a:t>
+            </a:r>
+          </a:p>
+          <a:p>
+            <a:pPr lvl="1"/>
             <a:r>
               <a:rPr lang="en-US" dirty="0"/>
-              <a:t>/Formatting</a:t>
+              <a:t>Any user intersection of countries, health care metrics, and economic metrics</a:t>
             </a:r>
           </a:p>
           <a:p>
             <a:pPr lvl="1"/>
             <a:r>
               <a:rPr lang="en-US" dirty="0"/>
-              <a:t>Regressions?</a:t>
-            </a:r>
+              <a:t>Change can only be matched to change</a:t>
+            </a:r>
+          </a:p>
+          <a:p>
+            <a:pPr lvl="1"/>
+            <a:endParaRPr lang="en-US" dirty="0"/>
           </a:p>
           <a:p>
             <a:r>
               <a:rPr lang="en-US" dirty="0"/>
-              <a:t>Consider increasing number of surveys used (= more samples)</a:t>
+              <a:t>Economic/Health metrics and charts ready</a:t>
             </a:r>
           </a:p>
           <a:p>
             <a:r>
               <a:rPr lang="en-US" dirty="0"/>
-              <a:t>Add user input controls to allow better presentation of results?</a:t>
+              <a:t>Regression, country-specific sorting WIP</a:t>
+            </a:r>
+          </a:p>
+          <a:p>
+            <a:r>
+              <a:rPr lang="en-US" dirty="0"/>
+              <a:t>Will not crash/fail with any conceivable user input</a:t>
+            </a:r>
+          </a:p>
+        </p:txBody>
+      </p:sp>
+    </p:spTree>
+    <p:extLst>
+      <p:ext uri="{BB962C8B-B14F-4D97-AF65-F5344CB8AC3E}">
+        <p14:creationId xmlns:p14="http://schemas.microsoft.com/office/powerpoint/2010/main" val="3006858768"/>
+      </p:ext>
+    </p:extLst>
+  </p:cSld>
+  <p:clrMapOvr>
+    <a:masterClrMapping/>
+  </p:clrMapOvr>
+</p:sld>
+</file>
+
+<file path=ppt/slides/slide8.xml><?xml version="1.0" encoding="utf-8"?>
+<p:sld xmlns:a="http://schemas.openxmlformats.org/drawingml/2006/main" xmlns:r="http://schemas.openxmlformats.org/officeDocument/2006/relationships" xmlns:p="http://schemas.openxmlformats.org/presentationml/2006/main">
+  <p:cSld>
+    <p:spTree>
+      <p:nvGrpSpPr>
+        <p:cNvPr id="1" name=""/>
+        <p:cNvGrpSpPr/>
+        <p:nvPr/>
+      </p:nvGrpSpPr>
+      <p:grpSpPr>
+        <a:xfrm>
+          <a:off x="0" y="0"/>
+          <a:ext cx="0" cy="0"/>
+          <a:chOff x="0" y="0"/>
+          <a:chExt cx="0" cy="0"/>
+        </a:xfrm>
+      </p:grpSpPr>
+      <p:sp>
+        <p:nvSpPr>
+          <p:cNvPr id="2" name="Title 1">
+            <a:extLst>
+              <a:ext uri="{FF2B5EF4-FFF2-40B4-BE49-F238E27FC236}">
+                <a16:creationId xmlns:a16="http://schemas.microsoft.com/office/drawing/2014/main" id="{1B6B2C10-031A-4540-ADE2-EDDFD71151F4}"/>
+              </a:ext>
+            </a:extLst>
+          </p:cNvPr>
+          <p:cNvSpPr>
+            <a:spLocks noGrp="1"/>
+          </p:cNvSpPr>
+          <p:nvPr>
+            <p:ph type="title"/>
+          </p:nvPr>
+        </p:nvSpPr>
+        <p:spPr/>
+        <p:txBody>
+          <a:bodyPr/>
+          <a:lstStyle/>
+          <a:p>
+            <a:r>
+              <a:rPr lang="en-US" dirty="0"/>
+              <a:t>Final Product (cont.)</a:t>
             </a:r>
           </a:p>
         </p:txBody>
       </p:sp>
       <p:pic>
         <p:nvPicPr>
-          <p:cNvPr id="4" name="Content Placeholder 4">
-            <a:extLst>
-              <a:ext uri="{FF2B5EF4-FFF2-40B4-BE49-F238E27FC236}">
-                <a16:creationId xmlns:a16="http://schemas.microsoft.com/office/drawing/2014/main" id="{99C96E9B-59D2-40B8-9402-36AA9A972818}"/>
+          <p:cNvPr id="8" name="Picture 7">
+            <a:extLst>
+              <a:ext uri="{FF2B5EF4-FFF2-40B4-BE49-F238E27FC236}">
+                <a16:creationId xmlns:a16="http://schemas.microsoft.com/office/drawing/2014/main" id="{F7F6DA6F-85B3-4206-A28D-C101A2770B5F}"/>
               </a:ext>
             </a:extLst>
           </p:cNvPr>
@@ -4328,7 +4432,71 @@
           <p:nvPr/>
         </p:nvPicPr>
         <p:blipFill>
-          <a:blip r:embed="rId2">
+          <a:blip r:embed="rId2"/>
+          <a:stretch>
+            <a:fillRect/>
+          </a:stretch>
+        </p:blipFill>
+        <p:spPr>
+          <a:xfrm>
+            <a:off x="-1" y="2850328"/>
+            <a:ext cx="5255443" cy="4007672"/>
+          </a:xfrm>
+          <a:prstGeom prst="rect">
+            <a:avLst/>
+          </a:prstGeom>
+        </p:spPr>
+      </p:pic>
+      <p:sp>
+        <p:nvSpPr>
+          <p:cNvPr id="14" name="Content Placeholder 13">
+            <a:extLst>
+              <a:ext uri="{FF2B5EF4-FFF2-40B4-BE49-F238E27FC236}">
+                <a16:creationId xmlns:a16="http://schemas.microsoft.com/office/drawing/2014/main" id="{B0BF5C88-DEDA-4274-BEF2-0FB7E0523CD8}"/>
+              </a:ext>
+            </a:extLst>
+          </p:cNvPr>
+          <p:cNvSpPr>
+            <a:spLocks noGrp="1"/>
+          </p:cNvSpPr>
+          <p:nvPr>
+            <p:ph idx="1"/>
+          </p:nvPr>
+        </p:nvSpPr>
+        <p:spPr/>
+        <p:txBody>
+          <a:bodyPr/>
+          <a:lstStyle/>
+          <a:p>
+            <a:r>
+              <a:rPr lang="en-US" dirty="0"/>
+              <a:t>Functional, but mostly visual</a:t>
+            </a:r>
+          </a:p>
+          <a:p>
+            <a:r>
+              <a:rPr lang="en-US" dirty="0"/>
+              <a:t>Needs fixes for text length, visuals</a:t>
+            </a:r>
+          </a:p>
+        </p:txBody>
+      </p:sp>
+      <p:pic>
+        <p:nvPicPr>
+          <p:cNvPr id="19" name="Picture 18">
+            <a:extLst>
+              <a:ext uri="{FF2B5EF4-FFF2-40B4-BE49-F238E27FC236}">
+                <a16:creationId xmlns:a16="http://schemas.microsoft.com/office/drawing/2014/main" id="{47ACB61F-5D75-4FED-A98B-4338B6351597}"/>
+              </a:ext>
+            </a:extLst>
+          </p:cNvPr>
+          <p:cNvPicPr>
+            <a:picLocks noChangeAspect="1"/>
+          </p:cNvPicPr>
+          <p:nvPr/>
+        </p:nvPicPr>
+        <p:blipFill>
+          <a:blip r:embed="rId3">
             <a:extLst>
               <a:ext uri="{28A0092B-C50C-407E-A947-70E740481C1C}">
                 <a14:useLocalDpi xmlns:a14="http://schemas.microsoft.com/office/drawing/2010/main" val="0"/>
@@ -4341,44 +4509,8 @@
         </p:blipFill>
         <p:spPr>
           <a:xfrm>
-            <a:off x="906458" y="3798668"/>
-            <a:ext cx="4633362" cy="2697714"/>
-          </a:xfrm>
-          <a:prstGeom prst="rect">
-            <a:avLst/>
-          </a:prstGeom>
-        </p:spPr>
-      </p:pic>
-      <p:pic>
-        <p:nvPicPr>
-          <p:cNvPr id="5" name="Picture 4">
-            <a:extLst>
-              <a:ext uri="{FF2B5EF4-FFF2-40B4-BE49-F238E27FC236}">
-                <a16:creationId xmlns:a16="http://schemas.microsoft.com/office/drawing/2014/main" id="{443FF6FE-2CE1-43D2-931E-9A7861190491}"/>
-              </a:ext>
-            </a:extLst>
-          </p:cNvPr>
-          <p:cNvPicPr>
-            <a:picLocks noChangeAspect="1"/>
-          </p:cNvPicPr>
-          <p:nvPr/>
-        </p:nvPicPr>
-        <p:blipFill>
-          <a:blip r:embed="rId3">
-            <a:extLst>
-              <a:ext uri="{28A0092B-C50C-407E-A947-70E740481C1C}">
-                <a14:useLocalDpi xmlns:a14="http://schemas.microsoft.com/office/drawing/2010/main" val="0"/>
-              </a:ext>
-            </a:extLst>
-          </a:blip>
-          <a:stretch>
-            <a:fillRect/>
-          </a:stretch>
-        </p:blipFill>
-        <p:spPr>
-          <a:xfrm>
-            <a:off x="6126355" y="3798668"/>
-            <a:ext cx="5159187" cy="2663421"/>
+            <a:off x="7159659" y="2749589"/>
+            <a:ext cx="5032342" cy="4108411"/>
           </a:xfrm>
           <a:prstGeom prst="rect">
             <a:avLst/>
@@ -4388,7 +4520,7 @@
     </p:spTree>
     <p:extLst>
       <p:ext uri="{BB962C8B-B14F-4D97-AF65-F5344CB8AC3E}">
-        <p14:creationId xmlns:p14="http://schemas.microsoft.com/office/powerpoint/2010/main" val="3006858768"/>
+        <p14:creationId xmlns:p14="http://schemas.microsoft.com/office/powerpoint/2010/main" val="3396842800"/>
       </p:ext>
     </p:extLst>
   </p:cSld>

</xml_diff>